<commit_message>
Changed the example pptx
Changed the example pptx and removed key from git
</commit_message>
<xml_diff>
--- a/JupyterLab/example.pptx
+++ b/JupyterLab/example.pptx
@@ -6,10 +6,6 @@
   </p:sldMasterIdLst>
   <p:sldIdLst>
     <p:sldId id="256" r:id="rId2"/>
-    <p:sldId id="257" r:id="rId3"/>
-    <p:sldId id="258" r:id="rId4"/>
-    <p:sldId id="259" r:id="rId5"/>
-    <p:sldId id="260" r:id="rId6"/>
   </p:sldIdLst>
   <p:sldSz cx="12192000" cy="6858000"/>
   <p:notesSz cx="6858000" cy="9144000"/>
@@ -108,6 +104,11 @@
       </a:defRPr>
     </a:lvl9pPr>
   </p:defaultTextStyle>
+  <p:extLst>
+    <p:ext uri="{EFAFB233-063F-42B5-8137-9DF3F51BA10A}">
+      <p15:sldGuideLst xmlns:p15="http://schemas.microsoft.com/office/powerpoint/2012/main"/>
+    </p:ext>
+  </p:extLst>
 </p:presentation>
 </file>
 
@@ -260,7 +261,7 @@
           <a:p>
             <a:fld id="{13B990A0-457D-42B2-8685-84E62069EF91}" type="datetimeFigureOut">
               <a:rPr lang="de-AT" smtClean="0"/>
-              <a:t>22.04.2022</a:t>
+              <a:t>23.04.2022</a:t>
             </a:fld>
             <a:endParaRPr lang="de-AT"/>
           </a:p>
@@ -460,7 +461,7 @@
           <a:p>
             <a:fld id="{13B990A0-457D-42B2-8685-84E62069EF91}" type="datetimeFigureOut">
               <a:rPr lang="de-AT" smtClean="0"/>
-              <a:t>22.04.2022</a:t>
+              <a:t>23.04.2022</a:t>
             </a:fld>
             <a:endParaRPr lang="de-AT"/>
           </a:p>
@@ -670,7 +671,7 @@
           <a:p>
             <a:fld id="{13B990A0-457D-42B2-8685-84E62069EF91}" type="datetimeFigureOut">
               <a:rPr lang="de-AT" smtClean="0"/>
-              <a:t>22.04.2022</a:t>
+              <a:t>23.04.2022</a:t>
             </a:fld>
             <a:endParaRPr lang="de-AT"/>
           </a:p>
@@ -870,7 +871,7 @@
           <a:p>
             <a:fld id="{13B990A0-457D-42B2-8685-84E62069EF91}" type="datetimeFigureOut">
               <a:rPr lang="de-AT" smtClean="0"/>
-              <a:t>22.04.2022</a:t>
+              <a:t>23.04.2022</a:t>
             </a:fld>
             <a:endParaRPr lang="de-AT"/>
           </a:p>
@@ -1146,7 +1147,7 @@
           <a:p>
             <a:fld id="{13B990A0-457D-42B2-8685-84E62069EF91}" type="datetimeFigureOut">
               <a:rPr lang="de-AT" smtClean="0"/>
-              <a:t>22.04.2022</a:t>
+              <a:t>23.04.2022</a:t>
             </a:fld>
             <a:endParaRPr lang="de-AT"/>
           </a:p>
@@ -1414,7 +1415,7 @@
           <a:p>
             <a:fld id="{13B990A0-457D-42B2-8685-84E62069EF91}" type="datetimeFigureOut">
               <a:rPr lang="de-AT" smtClean="0"/>
-              <a:t>22.04.2022</a:t>
+              <a:t>23.04.2022</a:t>
             </a:fld>
             <a:endParaRPr lang="de-AT"/>
           </a:p>
@@ -1829,7 +1830,7 @@
           <a:p>
             <a:fld id="{13B990A0-457D-42B2-8685-84E62069EF91}" type="datetimeFigureOut">
               <a:rPr lang="de-AT" smtClean="0"/>
-              <a:t>22.04.2022</a:t>
+              <a:t>23.04.2022</a:t>
             </a:fld>
             <a:endParaRPr lang="de-AT"/>
           </a:p>
@@ -1971,7 +1972,7 @@
           <a:p>
             <a:fld id="{13B990A0-457D-42B2-8685-84E62069EF91}" type="datetimeFigureOut">
               <a:rPr lang="de-AT" smtClean="0"/>
-              <a:t>22.04.2022</a:t>
+              <a:t>23.04.2022</a:t>
             </a:fld>
             <a:endParaRPr lang="de-AT"/>
           </a:p>
@@ -2084,7 +2085,7 @@
           <a:p>
             <a:fld id="{13B990A0-457D-42B2-8685-84E62069EF91}" type="datetimeFigureOut">
               <a:rPr lang="de-AT" smtClean="0"/>
-              <a:t>22.04.2022</a:t>
+              <a:t>23.04.2022</a:t>
             </a:fld>
             <a:endParaRPr lang="de-AT"/>
           </a:p>
@@ -2397,7 +2398,7 @@
           <a:p>
             <a:fld id="{13B990A0-457D-42B2-8685-84E62069EF91}" type="datetimeFigureOut">
               <a:rPr lang="de-AT" smtClean="0"/>
-              <a:t>22.04.2022</a:t>
+              <a:t>23.04.2022</a:t>
             </a:fld>
             <a:endParaRPr lang="de-AT"/>
           </a:p>
@@ -2686,7 +2687,7 @@
           <a:p>
             <a:fld id="{13B990A0-457D-42B2-8685-84E62069EF91}" type="datetimeFigureOut">
               <a:rPr lang="de-AT" smtClean="0"/>
-              <a:t>22.04.2022</a:t>
+              <a:t>23.04.2022</a:t>
             </a:fld>
             <a:endParaRPr lang="de-AT"/>
           </a:p>
@@ -2929,7 +2930,7 @@
           <a:p>
             <a:fld id="{13B990A0-457D-42B2-8685-84E62069EF91}" type="datetimeFigureOut">
               <a:rPr lang="de-AT" smtClean="0"/>
-              <a:t>22.04.2022</a:t>
+              <a:t>23.04.2022</a:t>
             </a:fld>
             <a:endParaRPr lang="de-AT"/>
           </a:p>
@@ -3368,35 +3369,36 @@
           <a:lstStyle/>
           <a:p>
             <a:r>
-              <a:rPr lang="de-DE" dirty="0"/>
-              <a:t>Hallo das ist ein Test</a:t>
+              <a:rPr lang="en-US" sz="1800" b="0" i="0" u="none" strike="noStrike" dirty="0">
+                <a:solidFill>
+                  <a:srgbClr val="85D5E6"/>
+                </a:solidFill>
+                <a:effectLst/>
+                <a:latin typeface="Montserrat" panose="020B0604020202020204" pitchFamily="2" charset="0"/>
+              </a:rPr>
+              <a:t>A neutron star is the collapsed core of a massive supergiant star, which had a total mass of between 10 and 25 solar masses, possibly more if the star was especially metal-rich. Neutron stars are the smallest and densest stellar objects, excluding black holes and hypothetical white holes, quark stars, and strange stars. Neutron stars have a radius on the order of 10 </a:t>
+            </a:r>
+            <a:r>
+              <a:rPr lang="en-US" sz="1800" b="0" i="0" u="none" strike="noStrike" dirty="0" err="1">
+                <a:solidFill>
+                  <a:srgbClr val="85D5E6"/>
+                </a:solidFill>
+                <a:effectLst/>
+                <a:latin typeface="Montserrat" panose="020B0604020202020204" pitchFamily="2" charset="0"/>
+              </a:rPr>
+              <a:t>kilometres</a:t>
+            </a:r>
+            <a:r>
+              <a:rPr lang="en-US" sz="1800" b="0" i="0" u="none" strike="noStrike" dirty="0">
+                <a:solidFill>
+                  <a:srgbClr val="85D5E6"/>
+                </a:solidFill>
+                <a:effectLst/>
+                <a:latin typeface="Montserrat" panose="020B0604020202020204" pitchFamily="2" charset="0"/>
+              </a:rPr>
+              <a:t> (6.2 mi) and a mass of about 1.4 solar masses. They result from the supernova explosion of a massive star, combined with gravitational collapse, that compresses the core past white dwarf star density to that of atomic nuclei.</a:t>
             </a:r>
             <a:endParaRPr lang="de-AT" dirty="0"/>
-          </a:p>
-        </p:txBody>
-      </p:sp>
-      <p:sp>
-        <p:nvSpPr>
-          <p:cNvPr id="3" name="Untertitel 2">
-            <a:extLst>
-              <a:ext uri="{FF2B5EF4-FFF2-40B4-BE49-F238E27FC236}">
-                <a16:creationId xmlns:a16="http://schemas.microsoft.com/office/drawing/2014/main" id="{864008F0-95D2-40B0-89EE-ED862EA96F16}"/>
-              </a:ext>
-            </a:extLst>
-          </p:cNvPr>
-          <p:cNvSpPr>
-            <a:spLocks noGrp="1"/>
-          </p:cNvSpPr>
-          <p:nvPr>
-            <p:ph type="subTitle" idx="1"/>
-          </p:nvPr>
-        </p:nvSpPr>
-        <p:spPr/>
-        <p:txBody>
-          <a:bodyPr/>
-          <a:lstStyle/>
-          <a:p>
-            <a:endParaRPr lang="de-AT"/>
           </a:p>
         </p:txBody>
       </p:sp>
@@ -3404,392 +3406,6 @@
     <p:extLst>
       <p:ext uri="{BB962C8B-B14F-4D97-AF65-F5344CB8AC3E}">
         <p14:creationId xmlns:p14="http://schemas.microsoft.com/office/powerpoint/2010/main" val="505109327"/>
-      </p:ext>
-    </p:extLst>
-  </p:cSld>
-  <p:clrMapOvr>
-    <a:masterClrMapping/>
-  </p:clrMapOvr>
-</p:sld>
-</file>
-
-<file path=ppt/slides/slide2.xml><?xml version="1.0" encoding="utf-8"?>
-<p:sld xmlns:a="http://schemas.openxmlformats.org/drawingml/2006/main" xmlns:r="http://schemas.openxmlformats.org/officeDocument/2006/relationships" xmlns:p="http://schemas.openxmlformats.org/presentationml/2006/main">
-  <p:cSld>
-    <p:spTree>
-      <p:nvGrpSpPr>
-        <p:cNvPr id="1" name=""/>
-        <p:cNvGrpSpPr/>
-        <p:nvPr/>
-      </p:nvGrpSpPr>
-      <p:grpSpPr>
-        <a:xfrm>
-          <a:off x="0" y="0"/>
-          <a:ext cx="0" cy="0"/>
-          <a:chOff x="0" y="0"/>
-          <a:chExt cx="0" cy="0"/>
-        </a:xfrm>
-      </p:grpSpPr>
-      <p:sp>
-        <p:nvSpPr>
-          <p:cNvPr id="2" name="Titel 1">
-            <a:extLst>
-              <a:ext uri="{FF2B5EF4-FFF2-40B4-BE49-F238E27FC236}">
-                <a16:creationId xmlns:a16="http://schemas.microsoft.com/office/drawing/2014/main" id="{D5576D63-B1D3-472D-87B7-9E785F7986A7}"/>
-              </a:ext>
-            </a:extLst>
-          </p:cNvPr>
-          <p:cNvSpPr>
-            <a:spLocks noGrp="1"/>
-          </p:cNvSpPr>
-          <p:nvPr>
-            <p:ph type="title"/>
-          </p:nvPr>
-        </p:nvSpPr>
-        <p:spPr/>
-        <p:txBody>
-          <a:bodyPr/>
-          <a:lstStyle/>
-          <a:p>
-            <a:r>
-              <a:rPr lang="de-DE" dirty="0"/>
-              <a:t>AR</a:t>
-            </a:r>
-            <a:endParaRPr lang="de-AT" dirty="0"/>
-          </a:p>
-        </p:txBody>
-      </p:sp>
-      <p:sp>
-        <p:nvSpPr>
-          <p:cNvPr id="3" name="Inhaltsplatzhalter 2">
-            <a:extLst>
-              <a:ext uri="{FF2B5EF4-FFF2-40B4-BE49-F238E27FC236}">
-                <a16:creationId xmlns:a16="http://schemas.microsoft.com/office/drawing/2014/main" id="{D03E4F89-99AE-4D00-8AD6-93319A5FBA21}"/>
-              </a:ext>
-            </a:extLst>
-          </p:cNvPr>
-          <p:cNvSpPr>
-            <a:spLocks noGrp="1"/>
-          </p:cNvSpPr>
-          <p:nvPr>
-            <p:ph idx="1"/>
-          </p:nvPr>
-        </p:nvSpPr>
-        <p:spPr/>
-        <p:txBody>
-          <a:bodyPr/>
-          <a:lstStyle/>
-          <a:p>
-            <a:r>
-              <a:rPr lang="de-DE" dirty="0"/>
-              <a:t>1999</a:t>
-            </a:r>
-          </a:p>
-          <a:p>
-            <a:r>
-              <a:rPr lang="de-DE" dirty="0"/>
-              <a:t>Karotte</a:t>
-            </a:r>
-          </a:p>
-          <a:p>
-            <a:r>
-              <a:rPr lang="de-DE" dirty="0"/>
-              <a:t>Patrick</a:t>
-            </a:r>
-          </a:p>
-          <a:p>
-            <a:r>
-              <a:rPr lang="de-DE" dirty="0"/>
-              <a:t>Hallo </a:t>
-            </a:r>
-          </a:p>
-          <a:p>
-            <a:r>
-              <a:rPr lang="de-DE" dirty="0"/>
-              <a:t>Maulwurf</a:t>
-            </a:r>
-            <a:endParaRPr lang="de-AT" dirty="0"/>
-          </a:p>
-        </p:txBody>
-      </p:sp>
-    </p:spTree>
-    <p:extLst>
-      <p:ext uri="{BB962C8B-B14F-4D97-AF65-F5344CB8AC3E}">
-        <p14:creationId xmlns:p14="http://schemas.microsoft.com/office/powerpoint/2010/main" val="1677996573"/>
-      </p:ext>
-    </p:extLst>
-  </p:cSld>
-  <p:clrMapOvr>
-    <a:masterClrMapping/>
-  </p:clrMapOvr>
-</p:sld>
-</file>
-
-<file path=ppt/slides/slide3.xml><?xml version="1.0" encoding="utf-8"?>
-<p:sld xmlns:a="http://schemas.openxmlformats.org/drawingml/2006/main" xmlns:r="http://schemas.openxmlformats.org/officeDocument/2006/relationships" xmlns:p="http://schemas.openxmlformats.org/presentationml/2006/main">
-  <p:cSld>
-    <p:spTree>
-      <p:nvGrpSpPr>
-        <p:cNvPr id="1" name=""/>
-        <p:cNvGrpSpPr/>
-        <p:nvPr/>
-      </p:nvGrpSpPr>
-      <p:grpSpPr>
-        <a:xfrm>
-          <a:off x="0" y="0"/>
-          <a:ext cx="0" cy="0"/>
-          <a:chOff x="0" y="0"/>
-          <a:chExt cx="0" cy="0"/>
-        </a:xfrm>
-      </p:grpSpPr>
-      <p:sp>
-        <p:nvSpPr>
-          <p:cNvPr id="2" name="Titel 1">
-            <a:extLst>
-              <a:ext uri="{FF2B5EF4-FFF2-40B4-BE49-F238E27FC236}">
-                <a16:creationId xmlns:a16="http://schemas.microsoft.com/office/drawing/2014/main" id="{CECEA7F1-4303-448D-871E-96E5A231E639}"/>
-              </a:ext>
-            </a:extLst>
-          </p:cNvPr>
-          <p:cNvSpPr>
-            <a:spLocks noGrp="1"/>
-          </p:cNvSpPr>
-          <p:nvPr>
-            <p:ph type="title"/>
-          </p:nvPr>
-        </p:nvSpPr>
-        <p:spPr/>
-        <p:txBody>
-          <a:bodyPr/>
-          <a:lstStyle/>
-          <a:p>
-            <a:r>
-              <a:rPr lang="de-DE" dirty="0"/>
-              <a:t>Mixed Reality</a:t>
-            </a:r>
-            <a:endParaRPr lang="de-AT" dirty="0"/>
-          </a:p>
-        </p:txBody>
-      </p:sp>
-      <p:sp>
-        <p:nvSpPr>
-          <p:cNvPr id="3" name="Inhaltsplatzhalter 2">
-            <a:extLst>
-              <a:ext uri="{FF2B5EF4-FFF2-40B4-BE49-F238E27FC236}">
-                <a16:creationId xmlns:a16="http://schemas.microsoft.com/office/drawing/2014/main" id="{C5F8D819-4B11-4D0F-B300-8022BF912D36}"/>
-              </a:ext>
-            </a:extLst>
-          </p:cNvPr>
-          <p:cNvSpPr>
-            <a:spLocks noGrp="1"/>
-          </p:cNvSpPr>
-          <p:nvPr>
-            <p:ph idx="1"/>
-          </p:nvPr>
-        </p:nvSpPr>
-        <p:spPr/>
-        <p:txBody>
-          <a:bodyPr/>
-          <a:lstStyle/>
-          <a:p>
-            <a:endParaRPr lang="de-AT"/>
-          </a:p>
-        </p:txBody>
-      </p:sp>
-    </p:spTree>
-    <p:extLst>
-      <p:ext uri="{BB962C8B-B14F-4D97-AF65-F5344CB8AC3E}">
-        <p14:creationId xmlns:p14="http://schemas.microsoft.com/office/powerpoint/2010/main" val="3863789163"/>
-      </p:ext>
-    </p:extLst>
-  </p:cSld>
-  <p:clrMapOvr>
-    <a:masterClrMapping/>
-  </p:clrMapOvr>
-</p:sld>
-</file>
-
-<file path=ppt/slides/slide4.xml><?xml version="1.0" encoding="utf-8"?>
-<p:sld xmlns:a="http://schemas.openxmlformats.org/drawingml/2006/main" xmlns:r="http://schemas.openxmlformats.org/officeDocument/2006/relationships" xmlns:p="http://schemas.openxmlformats.org/presentationml/2006/main">
-  <p:cSld>
-    <p:spTree>
-      <p:nvGrpSpPr>
-        <p:cNvPr id="1" name=""/>
-        <p:cNvGrpSpPr/>
-        <p:nvPr/>
-      </p:nvGrpSpPr>
-      <p:grpSpPr>
-        <a:xfrm>
-          <a:off x="0" y="0"/>
-          <a:ext cx="0" cy="0"/>
-          <a:chOff x="0" y="0"/>
-          <a:chExt cx="0" cy="0"/>
-        </a:xfrm>
-      </p:grpSpPr>
-      <p:sp>
-        <p:nvSpPr>
-          <p:cNvPr id="2" name="Titel 1">
-            <a:extLst>
-              <a:ext uri="{FF2B5EF4-FFF2-40B4-BE49-F238E27FC236}">
-                <a16:creationId xmlns:a16="http://schemas.microsoft.com/office/drawing/2014/main" id="{079E5BA8-DD8E-4835-9508-7B80C8E59F6C}"/>
-              </a:ext>
-            </a:extLst>
-          </p:cNvPr>
-          <p:cNvSpPr>
-            <a:spLocks noGrp="1"/>
-          </p:cNvSpPr>
-          <p:nvPr>
-            <p:ph type="title"/>
-          </p:nvPr>
-        </p:nvSpPr>
-        <p:spPr/>
-        <p:txBody>
-          <a:bodyPr/>
-          <a:lstStyle/>
-          <a:p>
-            <a:endParaRPr lang="de-AT"/>
-          </a:p>
-        </p:txBody>
-      </p:sp>
-      <p:sp>
-        <p:nvSpPr>
-          <p:cNvPr id="3" name="Inhaltsplatzhalter 2">
-            <a:extLst>
-              <a:ext uri="{FF2B5EF4-FFF2-40B4-BE49-F238E27FC236}">
-                <a16:creationId xmlns:a16="http://schemas.microsoft.com/office/drawing/2014/main" id="{53FCA276-7D63-4A1B-AB9A-76DB7EF4C0E5}"/>
-              </a:ext>
-            </a:extLst>
-          </p:cNvPr>
-          <p:cNvSpPr>
-            <a:spLocks noGrp="1"/>
-          </p:cNvSpPr>
-          <p:nvPr>
-            <p:ph idx="1"/>
-          </p:nvPr>
-        </p:nvSpPr>
-        <p:spPr/>
-        <p:txBody>
-          <a:bodyPr/>
-          <a:lstStyle/>
-          <a:p>
-            <a:r>
-              <a:rPr lang="de-DE" dirty="0"/>
-              <a:t>Das macht keinen Spaß</a:t>
-            </a:r>
-          </a:p>
-          <a:p>
-            <a:r>
-              <a:rPr lang="de-DE" dirty="0" err="1"/>
-              <a:t>Some</a:t>
-            </a:r>
-            <a:r>
-              <a:rPr lang="de-DE" dirty="0"/>
-              <a:t> </a:t>
-            </a:r>
-            <a:r>
-              <a:rPr lang="de-DE" dirty="0" err="1"/>
-              <a:t>random</a:t>
-            </a:r>
-            <a:r>
-              <a:rPr lang="de-DE" dirty="0"/>
-              <a:t> </a:t>
-            </a:r>
-            <a:r>
-              <a:rPr lang="de-DE" dirty="0" err="1"/>
-              <a:t>text</a:t>
-            </a:r>
-            <a:endParaRPr lang="de-AT" dirty="0"/>
-          </a:p>
-        </p:txBody>
-      </p:sp>
-    </p:spTree>
-    <p:extLst>
-      <p:ext uri="{BB962C8B-B14F-4D97-AF65-F5344CB8AC3E}">
-        <p14:creationId xmlns:p14="http://schemas.microsoft.com/office/powerpoint/2010/main" val="4250968538"/>
-      </p:ext>
-    </p:extLst>
-  </p:cSld>
-  <p:clrMapOvr>
-    <a:masterClrMapping/>
-  </p:clrMapOvr>
-</p:sld>
-</file>
-
-<file path=ppt/slides/slide5.xml><?xml version="1.0" encoding="utf-8"?>
-<p:sld xmlns:a="http://schemas.openxmlformats.org/drawingml/2006/main" xmlns:r="http://schemas.openxmlformats.org/officeDocument/2006/relationships" xmlns:p="http://schemas.openxmlformats.org/presentationml/2006/main">
-  <p:cSld>
-    <p:spTree>
-      <p:nvGrpSpPr>
-        <p:cNvPr id="1" name=""/>
-        <p:cNvGrpSpPr/>
-        <p:nvPr/>
-      </p:nvGrpSpPr>
-      <p:grpSpPr>
-        <a:xfrm>
-          <a:off x="0" y="0"/>
-          <a:ext cx="0" cy="0"/>
-          <a:chOff x="0" y="0"/>
-          <a:chExt cx="0" cy="0"/>
-        </a:xfrm>
-      </p:grpSpPr>
-      <p:sp>
-        <p:nvSpPr>
-          <p:cNvPr id="2" name="Titel 1">
-            <a:extLst>
-              <a:ext uri="{FF2B5EF4-FFF2-40B4-BE49-F238E27FC236}">
-                <a16:creationId xmlns:a16="http://schemas.microsoft.com/office/drawing/2014/main" id="{9F34E802-C99F-4B88-A2E2-AADC7592965D}"/>
-              </a:ext>
-            </a:extLst>
-          </p:cNvPr>
-          <p:cNvSpPr>
-            <a:spLocks noGrp="1"/>
-          </p:cNvSpPr>
-          <p:nvPr>
-            <p:ph type="title"/>
-          </p:nvPr>
-        </p:nvSpPr>
-        <p:spPr/>
-        <p:txBody>
-          <a:bodyPr/>
-          <a:lstStyle/>
-          <a:p>
-            <a:r>
-              <a:rPr lang="de-DE" dirty="0"/>
-              <a:t>VR</a:t>
-            </a:r>
-            <a:endParaRPr lang="de-AT" dirty="0"/>
-          </a:p>
-        </p:txBody>
-      </p:sp>
-      <p:sp>
-        <p:nvSpPr>
-          <p:cNvPr id="3" name="Inhaltsplatzhalter 2">
-            <a:extLst>
-              <a:ext uri="{FF2B5EF4-FFF2-40B4-BE49-F238E27FC236}">
-                <a16:creationId xmlns:a16="http://schemas.microsoft.com/office/drawing/2014/main" id="{48534374-0284-4484-908D-98CEB2D4B803}"/>
-              </a:ext>
-            </a:extLst>
-          </p:cNvPr>
-          <p:cNvSpPr>
-            <a:spLocks noGrp="1"/>
-          </p:cNvSpPr>
-          <p:nvPr>
-            <p:ph idx="1"/>
-          </p:nvPr>
-        </p:nvSpPr>
-        <p:spPr/>
-        <p:txBody>
-          <a:bodyPr/>
-          <a:lstStyle/>
-          <a:p>
-            <a:endParaRPr lang="de-AT" dirty="0"/>
-          </a:p>
-        </p:txBody>
-      </p:sp>
-    </p:spTree>
-    <p:extLst>
-      <p:ext uri="{BB962C8B-B14F-4D97-AF65-F5344CB8AC3E}">
-        <p14:creationId xmlns:p14="http://schemas.microsoft.com/office/powerpoint/2010/main" val="429559075"/>
       </p:ext>
     </p:extLst>
   </p:cSld>

</xml_diff>